<commit_message>
Updated the PowerPoint deck to show reference to the GitHub repository.
</commit_message>
<xml_diff>
--- a/CSC543FinalProject/CSC 543 - Spring 2021 - Final Project - Bob Elward.pptx
+++ b/CSC543FinalProject/CSC 543 - Spring 2021 - Final Project - Bob Elward.pptx
@@ -125,7 +125,7 @@
 <file path=ppt/revisionInfo.xml><?xml version="1.0" encoding="utf-8"?>
 <p1510:revInfo xmlns:a="http://schemas.openxmlformats.org/drawingml/2006/main" xmlns:r="http://schemas.openxmlformats.org/officeDocument/2006/relationships" xmlns:p1510="http://schemas.microsoft.com/office/powerpoint/2015/10/main">
   <p1510:revLst>
-    <p1510:client id="{607681AF-7AAC-4B91-A1BC-14E95AC55DD5}" v="12" dt="2021-04-20T14:54:00.859"/>
+    <p1510:client id="{607681AF-7AAC-4B91-A1BC-14E95AC55DD5}" v="13" dt="2021-04-20T20:17:51.591"/>
   </p1510:revLst>
 </p1510:revInfo>
 </file>
@@ -135,7 +135,7 @@
   <pc:docChgLst>
     <pc:chgData name="Bob E" userId="3e98a89c1d755d3b" providerId="LiveId" clId="{607681AF-7AAC-4B91-A1BC-14E95AC55DD5}"/>
     <pc:docChg chg="undo custSel addSld delSld modSld">
-      <pc:chgData name="Bob E" userId="3e98a89c1d755d3b" providerId="LiveId" clId="{607681AF-7AAC-4B91-A1BC-14E95AC55DD5}" dt="2021-04-20T15:57:56.973" v="1902" actId="5793"/>
+      <pc:chgData name="Bob E" userId="3e98a89c1d755d3b" providerId="LiveId" clId="{607681AF-7AAC-4B91-A1BC-14E95AC55DD5}" dt="2021-04-20T20:17:33.347" v="1928"/>
       <pc:docMkLst>
         <pc:docMk/>
       </pc:docMkLst>
@@ -193,13 +193,13 @@
         </pc:spChg>
       </pc:sldChg>
       <pc:sldChg chg="modSp mod">
-        <pc:chgData name="Bob E" userId="3e98a89c1d755d3b" providerId="LiveId" clId="{607681AF-7AAC-4B91-A1BC-14E95AC55DD5}" dt="2021-04-20T14:47:36.792" v="1478" actId="115"/>
+        <pc:chgData name="Bob E" userId="3e98a89c1d755d3b" providerId="LiveId" clId="{607681AF-7AAC-4B91-A1BC-14E95AC55DD5}" dt="2021-04-20T20:17:33.347" v="1928"/>
         <pc:sldMkLst>
           <pc:docMk/>
           <pc:sldMk cId="434758405" sldId="272"/>
         </pc:sldMkLst>
         <pc:spChg chg="mod">
-          <ac:chgData name="Bob E" userId="3e98a89c1d755d3b" providerId="LiveId" clId="{607681AF-7AAC-4B91-A1BC-14E95AC55DD5}" dt="2021-04-20T14:47:36.792" v="1478" actId="115"/>
+          <ac:chgData name="Bob E" userId="3e98a89c1d755d3b" providerId="LiveId" clId="{607681AF-7AAC-4B91-A1BC-14E95AC55DD5}" dt="2021-04-20T20:17:33.347" v="1928"/>
           <ac:spMkLst>
             <pc:docMk/>
             <pc:sldMk cId="434758405" sldId="272"/>
@@ -1115,7 +1115,7 @@
           <a:p>
             <a:fld id="{EA0C0817-A112-4847-8014-A94B7D2A4EA3}" type="datetime1">
               <a:rPr lang="en-US" smtClean="0"/>
-              <a:t>4/19/2021</a:t>
+              <a:t>4/20/2021</a:t>
             </a:fld>
             <a:endParaRPr lang="en-US" dirty="0"/>
           </a:p>
@@ -1317,7 +1317,7 @@
           <a:p>
             <a:fld id="{7332B432-ACDA-4023-A761-2BAB76577B62}" type="datetime1">
               <a:rPr lang="en-US" smtClean="0"/>
-              <a:t>4/19/2021</a:t>
+              <a:t>4/20/2021</a:t>
             </a:fld>
             <a:endParaRPr lang="en-US" dirty="0"/>
           </a:p>
@@ -1916,7 +1916,7 @@
           <a:p>
             <a:fld id="{D9C646AA-F36E-4540-911D-FFFC0A0EF24A}" type="datetime1">
               <a:rPr lang="en-US" smtClean="0"/>
-              <a:t>4/19/2021</a:t>
+              <a:t>4/20/2021</a:t>
             </a:fld>
             <a:endParaRPr lang="en-US" dirty="0"/>
           </a:p>
@@ -2236,7 +2236,7 @@
           <a:p>
             <a:fld id="{69186D26-FA5F-4637-B602-B7C2DC34CFD4}" type="datetime1">
               <a:rPr lang="en-US" smtClean="0"/>
-              <a:t>4/19/2021</a:t>
+              <a:t>4/20/2021</a:t>
             </a:fld>
             <a:endParaRPr lang="en-US" dirty="0"/>
           </a:p>
@@ -2673,7 +2673,7 @@
           <a:p>
             <a:fld id="{8A7F15D8-96D1-4781-BC50-CA8A088B2FE4}" type="datetime1">
               <a:rPr lang="en-US" smtClean="0"/>
-              <a:t>4/19/2021</a:t>
+              <a:t>4/20/2021</a:t>
             </a:fld>
             <a:endParaRPr lang="en-US" dirty="0"/>
           </a:p>
@@ -2791,7 +2791,7 @@
           <a:p>
             <a:fld id="{F9A96C99-B8F8-4528-BD05-0E16E943DC09}" type="datetime1">
               <a:rPr lang="en-US" smtClean="0"/>
-              <a:t>4/19/2021</a:t>
+              <a:t>4/20/2021</a:t>
             </a:fld>
             <a:endParaRPr lang="en-US" dirty="0"/>
           </a:p>
@@ -2886,7 +2886,7 @@
           <a:p>
             <a:fld id="{03636942-C211-4B28-8DBD-C953E00AF71B}" type="datetime1">
               <a:rPr lang="en-US" smtClean="0"/>
-              <a:t>4/19/2021</a:t>
+              <a:t>4/20/2021</a:t>
             </a:fld>
             <a:endParaRPr lang="en-US" dirty="0"/>
           </a:p>
@@ -3303,7 +3303,7 @@
           <a:p>
             <a:fld id="{7E8D12A6-918A-48BD-8CB9-CA713993B0EA}" type="datetime1">
               <a:rPr lang="en-US" smtClean="0"/>
-              <a:t>4/19/2021</a:t>
+              <a:t>4/20/2021</a:t>
             </a:fld>
             <a:endParaRPr lang="en-US" dirty="0"/>
           </a:p>
@@ -3565,7 +3565,7 @@
             <a:fld id="{E778CE86-875F-4587-BCF6-FA054AFC0D53}" type="datetime1">
               <a:rPr lang="en-US" smtClean="0"/>
               <a:pPr/>
-              <a:t>4/19/2021</a:t>
+              <a:t>4/20/2021</a:t>
             </a:fld>
             <a:endParaRPr lang="en-US" dirty="0"/>
           </a:p>
@@ -4081,7 +4081,7 @@
           <a:p>
             <a:fld id="{F6FA2B21-3FCD-4721-B95C-427943F61125}" type="datetime1">
               <a:rPr lang="en-US" smtClean="0"/>
-              <a:t>4/19/2021</a:t>
+              <a:t>4/20/2021</a:t>
             </a:fld>
             <a:endParaRPr lang="en-US" dirty="0"/>
           </a:p>
@@ -5102,7 +5102,7 @@
         <p:spPr/>
         <p:txBody>
           <a:bodyPr>
-            <a:normAutofit/>
+            <a:normAutofit lnSpcReduction="10000"/>
           </a:bodyPr>
           <a:lstStyle/>
           <a:p>
@@ -5167,6 +5167,19 @@
               <a:rPr lang="en-US" sz="1800" dirty="0"/>
               <a:t>iOS</a:t>
             </a:r>
+          </a:p>
+          <a:p>
+            <a:r>
+              <a:rPr lang="en-US" sz="2000" dirty="0"/>
+              <a:t>GitHub Repository: </a:t>
+            </a:r>
+            <a:r>
+              <a:rPr lang="en-US" sz="2000" dirty="0">
+                <a:hlinkClick r:id="rId2"/>
+              </a:rPr>
+              <a:t>https://github.com/belward1/CSC543FinalProject</a:t>
+            </a:r>
+            <a:endParaRPr lang="en-US" sz="2000" dirty="0"/>
           </a:p>
         </p:txBody>
       </p:sp>
@@ -7746,21 +7759,21 @@
 </file>
 
 <file path=customXml/item2.xml><?xml version="1.0" encoding="utf-8"?>
+<p:properties xmlns:p="http://schemas.microsoft.com/office/2006/metadata/properties" xmlns:xsi="http://www.w3.org/2001/XMLSchema-instance" xmlns:pc="http://schemas.microsoft.com/office/infopath/2007/PartnerControls">
+  <documentManagement>
+    <Status xmlns="71af3243-3dd4-4a8d-8c0d-dd76da1f02a5">Not started</Status>
+    <MediaServiceKeyPoints xmlns="71af3243-3dd4-4a8d-8c0d-dd76da1f02a5" xsi:nil="true"/>
+  </documentManagement>
+</p:properties>
+</file>
+
+<file path=customXml/item3.xml><?xml version="1.0" encoding="utf-8"?>
 <?mso-contentType ?>
 <FormTemplates xmlns="http://schemas.microsoft.com/sharepoint/v3/contenttype/forms">
   <Display>DocumentLibraryForm</Display>
   <Edit>DocumentLibraryForm</Edit>
   <New>DocumentLibraryForm</New>
 </FormTemplates>
-</file>
-
-<file path=customXml/item3.xml><?xml version="1.0" encoding="utf-8"?>
-<p:properties xmlns:p="http://schemas.microsoft.com/office/2006/metadata/properties" xmlns:xsi="http://www.w3.org/2001/XMLSchema-instance" xmlns:pc="http://schemas.microsoft.com/office/infopath/2007/PartnerControls">
-  <documentManagement>
-    <Status xmlns="71af3243-3dd4-4a8d-8c0d-dd76da1f02a5">Not started</Status>
-    <MediaServiceKeyPoints xmlns="71af3243-3dd4-4a8d-8c0d-dd76da1f02a5" xsi:nil="true"/>
-  </documentManagement>
-</p:properties>
 </file>
 
 <file path=customXml/itemProps1.xml><?xml version="1.0" encoding="utf-8"?>
@@ -7783,14 +7796,6 @@
 </file>
 
 <file path=customXml/itemProps2.xml><?xml version="1.0" encoding="utf-8"?>
-<ds:datastoreItem xmlns:ds="http://schemas.openxmlformats.org/officeDocument/2006/customXml" ds:itemID="{CDB58277-F8DF-46FF-84EC-EF41B835E69F}">
-  <ds:schemaRefs>
-    <ds:schemaRef ds:uri="http://schemas.microsoft.com/sharepoint/v3/contenttype/forms"/>
-  </ds:schemaRefs>
-</ds:datastoreItem>
-</file>
-
-<file path=customXml/itemProps3.xml><?xml version="1.0" encoding="utf-8"?>
 <ds:datastoreItem xmlns:ds="http://schemas.openxmlformats.org/officeDocument/2006/customXml" ds:itemID="{137651BA-F45C-4845-9AB3-E0A65B39F5E1}">
   <ds:schemaRefs>
     <ds:schemaRef ds:uri="http://schemas.microsoft.com/office/2006/metadata/properties"/>
@@ -7798,4 +7803,12 @@
     <ds:schemaRef ds:uri="71af3243-3dd4-4a8d-8c0d-dd76da1f02a5"/>
   </ds:schemaRefs>
 </ds:datastoreItem>
+</file>
+
+<file path=customXml/itemProps3.xml><?xml version="1.0" encoding="utf-8"?>
+<ds:datastoreItem xmlns:ds="http://schemas.openxmlformats.org/officeDocument/2006/customXml" ds:itemID="{CDB58277-F8DF-46FF-84EC-EF41B835E69F}">
+  <ds:schemaRefs>
+    <ds:schemaRef ds:uri="http://schemas.microsoft.com/sharepoint/v3/contenttype/forms"/>
+  </ds:schemaRefs>
+</ds:datastoreItem>
 </file>
</xml_diff>